<commit_message>
Renaming of shapes in cardCreator-test.pptx
</commit_message>
<xml_diff>
--- a/cardCreator-test.pptx
+++ b/cardCreator-test.pptx
@@ -197,7 +197,7 @@
           <a:p>
             <a:fld id="{D692AC70-36B3-B240-971E-FFC273BEE5F2}" type="datetimeFigureOut">
               <a:rPr lang="en-DK" smtClean="0"/>
-              <a:t>30/11/2023</a:t>
+              <a:t>12/23/2023</a:t>
             </a:fld>
             <a:endParaRPr lang="en-DK"/>
           </a:p>
@@ -596,7 +596,7 @@
           <a:p>
             <a:fld id="{8774F81B-ED26-2A43-87D5-CF94F7E07933}" type="datetimeFigureOut">
               <a:rPr lang="en-DK" smtClean="0"/>
-              <a:t>30/11/2023</a:t>
+              <a:t>12/23/2023</a:t>
             </a:fld>
             <a:endParaRPr lang="en-DK"/>
           </a:p>
@@ -766,7 +766,7 @@
           <a:p>
             <a:fld id="{8774F81B-ED26-2A43-87D5-CF94F7E07933}" type="datetimeFigureOut">
               <a:rPr lang="en-DK" smtClean="0"/>
-              <a:t>30/11/2023</a:t>
+              <a:t>12/23/2023</a:t>
             </a:fld>
             <a:endParaRPr lang="en-DK"/>
           </a:p>
@@ -946,7 +946,7 @@
           <a:p>
             <a:fld id="{8774F81B-ED26-2A43-87D5-CF94F7E07933}" type="datetimeFigureOut">
               <a:rPr lang="en-DK" smtClean="0"/>
-              <a:t>30/11/2023</a:t>
+              <a:t>12/23/2023</a:t>
             </a:fld>
             <a:endParaRPr lang="en-DK"/>
           </a:p>
@@ -1116,7 +1116,7 @@
           <a:p>
             <a:fld id="{8774F81B-ED26-2A43-87D5-CF94F7E07933}" type="datetimeFigureOut">
               <a:rPr lang="en-DK" smtClean="0"/>
-              <a:t>30/11/2023</a:t>
+              <a:t>12/23/2023</a:t>
             </a:fld>
             <a:endParaRPr lang="en-DK"/>
           </a:p>
@@ -1360,7 +1360,7 @@
           <a:p>
             <a:fld id="{8774F81B-ED26-2A43-87D5-CF94F7E07933}" type="datetimeFigureOut">
               <a:rPr lang="en-DK" smtClean="0"/>
-              <a:t>30/11/2023</a:t>
+              <a:t>12/23/2023</a:t>
             </a:fld>
             <a:endParaRPr lang="en-DK"/>
           </a:p>
@@ -1592,7 +1592,7 @@
           <a:p>
             <a:fld id="{8774F81B-ED26-2A43-87D5-CF94F7E07933}" type="datetimeFigureOut">
               <a:rPr lang="en-DK" smtClean="0"/>
-              <a:t>30/11/2023</a:t>
+              <a:t>12/23/2023</a:t>
             </a:fld>
             <a:endParaRPr lang="en-DK"/>
           </a:p>
@@ -1959,7 +1959,7 @@
           <a:p>
             <a:fld id="{8774F81B-ED26-2A43-87D5-CF94F7E07933}" type="datetimeFigureOut">
               <a:rPr lang="en-DK" smtClean="0"/>
-              <a:t>30/11/2023</a:t>
+              <a:t>12/23/2023</a:t>
             </a:fld>
             <a:endParaRPr lang="en-DK"/>
           </a:p>
@@ -2077,7 +2077,7 @@
           <a:p>
             <a:fld id="{8774F81B-ED26-2A43-87D5-CF94F7E07933}" type="datetimeFigureOut">
               <a:rPr lang="en-DK" smtClean="0"/>
-              <a:t>30/11/2023</a:t>
+              <a:t>12/23/2023</a:t>
             </a:fld>
             <a:endParaRPr lang="en-DK"/>
           </a:p>
@@ -2172,7 +2172,7 @@
           <a:p>
             <a:fld id="{8774F81B-ED26-2A43-87D5-CF94F7E07933}" type="datetimeFigureOut">
               <a:rPr lang="en-DK" smtClean="0"/>
-              <a:t>30/11/2023</a:t>
+              <a:t>12/23/2023</a:t>
             </a:fld>
             <a:endParaRPr lang="en-DK"/>
           </a:p>
@@ -2449,7 +2449,7 @@
           <a:p>
             <a:fld id="{8774F81B-ED26-2A43-87D5-CF94F7E07933}" type="datetimeFigureOut">
               <a:rPr lang="en-DK" smtClean="0"/>
-              <a:t>30/11/2023</a:t>
+              <a:t>12/23/2023</a:t>
             </a:fld>
             <a:endParaRPr lang="en-DK"/>
           </a:p>
@@ -2706,7 +2706,7 @@
           <a:p>
             <a:fld id="{8774F81B-ED26-2A43-87D5-CF94F7E07933}" type="datetimeFigureOut">
               <a:rPr lang="en-DK" smtClean="0"/>
-              <a:t>30/11/2023</a:t>
+              <a:t>12/23/2023</a:t>
             </a:fld>
             <a:endParaRPr lang="en-DK"/>
           </a:p>
@@ -2919,7 +2919,7 @@
           <a:p>
             <a:fld id="{8774F81B-ED26-2A43-87D5-CF94F7E07933}" type="datetimeFigureOut">
               <a:rPr lang="en-DK" smtClean="0"/>
-              <a:t>30/11/2023</a:t>
+              <a:t>12/23/2023</a:t>
             </a:fld>
             <a:endParaRPr lang="en-DK"/>
           </a:p>
@@ -3336,7 +3336,7 @@
       </p:grpSpPr>
       <p:pic>
         <p:nvPicPr>
-          <p:cNvPr id="9" name="Picture 8" descr="background">
+          <p:cNvPr id="9" name="Background">
             <a:extLst>
               <a:ext uri="{FF2B5EF4-FFF2-40B4-BE49-F238E27FC236}">
                 <a16:creationId xmlns:a16="http://schemas.microsoft.com/office/drawing/2014/main" id="{9E42C950-0EEE-DBB0-4FE0-C1F130D1762E}"/>
@@ -3350,14 +3350,13 @@
         </p:nvPicPr>
         <p:blipFill>
           <a:blip r:embed="rId2"/>
-          <a:stretch>
-            <a:fillRect/>
-          </a:stretch>
+          <a:srcRect/>
+          <a:stretch/>
         </p:blipFill>
         <p:spPr>
           <a:xfrm>
-            <a:off x="0" y="177"/>
-            <a:ext cx="7761288" cy="6624284"/>
+            <a:off x="71" y="177"/>
+            <a:ext cx="7761146" cy="6624284"/>
           </a:xfrm>
           <a:prstGeom prst="rect">
             <a:avLst/>
@@ -3366,7 +3365,7 @@
       </p:pic>
       <p:pic>
         <p:nvPicPr>
-          <p:cNvPr id="10" name="Picture 9">
+          <p:cNvPr id="10" name="Back Image">
             <a:extLst>
               <a:ext uri="{FF2B5EF4-FFF2-40B4-BE49-F238E27FC236}">
                 <a16:creationId xmlns:a16="http://schemas.microsoft.com/office/drawing/2014/main" id="{006ABE74-FC75-A065-4DD8-1DB9773F5131}"/>
@@ -3380,14 +3379,13 @@
         </p:nvPicPr>
         <p:blipFill>
           <a:blip r:embed="rId3"/>
-          <a:stretch>
-            <a:fillRect/>
-          </a:stretch>
+          <a:srcRect/>
+          <a:stretch/>
         </p:blipFill>
         <p:spPr>
           <a:xfrm>
-            <a:off x="5046566" y="1606987"/>
-            <a:ext cx="1546377" cy="2279915"/>
+            <a:off x="5048140" y="1606987"/>
+            <a:ext cx="1543229" cy="2279915"/>
           </a:xfrm>
           <a:prstGeom prst="rect">
             <a:avLst/>
@@ -3396,7 +3394,7 @@
       </p:pic>
       <p:sp>
         <p:nvSpPr>
-          <p:cNvPr id="2" name="Content Placeholder 2">
+          <p:cNvPr id="2" name="Back Title">
             <a:extLst>
               <a:ext uri="{FF2B5EF4-FFF2-40B4-BE49-F238E27FC236}">
                 <a16:creationId xmlns:a16="http://schemas.microsoft.com/office/drawing/2014/main" id="{3F2CBDA3-B1BA-AD33-B259-43B3F0914832}"/>
@@ -3591,6 +3589,7 @@
             </a:pPr>
             <a:r>
               <a:rPr lang="da-DK" sz="3000" i="1" spc="-50" dirty="0">
+                <a:solidFill/>
                 <a:latin typeface="Nodesto Caps Condensed" panose="02000500000000090000" pitchFamily="2" charset="0"/>
                 <a:ea typeface="Vollkorn" pitchFamily="2" charset="0"/>
               </a:rPr>
@@ -3605,7 +3604,7 @@
       </p:sp>
       <p:sp>
         <p:nvSpPr>
-          <p:cNvPr id="3" name="Content Placeholder 2">
+          <p:cNvPr id="3" name="Back Subtitle">
             <a:extLst>
               <a:ext uri="{FF2B5EF4-FFF2-40B4-BE49-F238E27FC236}">
                 <a16:creationId xmlns:a16="http://schemas.microsoft.com/office/drawing/2014/main" id="{FEAE9835-8E4D-281D-F34A-E3B6EB48A484}"/>
@@ -3802,7 +3801,7 @@
               <a:buNone/>
             </a:pPr>
             <a:r>
-              <a:rPr lang="en-DK" sz="1600" i="1" spc="30" dirty="0">
+              <a:rPr lang="en-US" sz="1600" i="1" spc="30" dirty="0">
                 <a:solidFill>
                   <a:srgbClr val="535456"/>
                 </a:solidFill>
@@ -3816,7 +3815,7 @@
       </p:sp>
       <p:sp>
         <p:nvSpPr>
-          <p:cNvPr id="6" name="Content Placeholder 2">
+          <p:cNvPr id="6" name="Front Subtitle">
             <a:extLst>
               <a:ext uri="{FF2B5EF4-FFF2-40B4-BE49-F238E27FC236}">
                 <a16:creationId xmlns:a16="http://schemas.microsoft.com/office/drawing/2014/main" id="{E42E524E-9DD9-8698-242C-C2EFDC3D2154}"/>
@@ -4013,7 +4012,7 @@
               <a:buNone/>
             </a:pPr>
             <a:r>
-              <a:rPr lang="en-DK" sz="1390" i="1" dirty="0">
+              <a:rPr lang="en-US" sz="1390" i="1" dirty="0">
                 <a:solidFill>
                   <a:srgbClr val="414142"/>
                 </a:solidFill>
@@ -4023,7 +4022,7 @@
               <a:t>Base </a:t>
             </a:r>
             <a:r>
-              <a:rPr lang="en-DK" sz="1390" i="1">
+              <a:rPr lang="en-US" sz="1390" i="1">
                 <a:solidFill>
                   <a:srgbClr val="414142"/>
                 </a:solidFill>
@@ -4044,7 +4043,7 @@
       </p:sp>
       <p:sp>
         <p:nvSpPr>
-          <p:cNvPr id="7" name="Content Placeholder 2">
+          <p:cNvPr id="7" name="Front Description">
             <a:extLst>
               <a:ext uri="{FF2B5EF4-FFF2-40B4-BE49-F238E27FC236}">
                 <a16:creationId xmlns:a16="http://schemas.microsoft.com/office/drawing/2014/main" id="{9CD8E20B-BDB7-C207-2BA2-1EBAB82F326C}"/>
@@ -4417,7 +4416,7 @@
       </p:sp>
       <p:sp>
         <p:nvSpPr>
-          <p:cNvPr id="8" name="Content Placeholder 2">
+          <p:cNvPr id="8" name="Front Title">
             <a:extLst>
               <a:ext uri="{FF2B5EF4-FFF2-40B4-BE49-F238E27FC236}">
                 <a16:creationId xmlns:a16="http://schemas.microsoft.com/office/drawing/2014/main" id="{539A80B2-2BD5-D6C8-2BE2-9D160DFA4E59}"/>
@@ -4632,7 +4631,7 @@
       </p:sp>
       <p:pic>
         <p:nvPicPr>
-          <p:cNvPr id="4" name="Picture 3">
+          <p:cNvPr id="4" name="Back Icon 1">
             <a:extLst>
               <a:ext uri="{FF2B5EF4-FFF2-40B4-BE49-F238E27FC236}">
                 <a16:creationId xmlns:a16="http://schemas.microsoft.com/office/drawing/2014/main" id="{5EE34A53-BA2F-5CD4-7EE7-5F5DB8C19480}"/>
@@ -4646,14 +4645,13 @@
         </p:nvPicPr>
         <p:blipFill>
           <a:blip r:embed="rId4"/>
-          <a:stretch>
-            <a:fillRect/>
-          </a:stretch>
+          <a:srcRect/>
+          <a:stretch/>
         </p:blipFill>
         <p:spPr>
           <a:xfrm>
-            <a:off x="4083943" y="178626"/>
-            <a:ext cx="335627" cy="362070"/>
+            <a:off x="4083943" y="179182"/>
+            <a:ext cx="335627" cy="360958"/>
           </a:xfrm>
           <a:prstGeom prst="rect">
             <a:avLst/>

</xml_diff>